<commit_message>
final version januar22 pres
</commit_message>
<xml_diff>
--- a/Presentations/Januar22Presentation.pptx
+++ b/Presentations/Januar22Presentation.pptx
@@ -491,6 +491,90 @@
     </a:lvl9pPr>
   </p:notesStyle>
 </p:notesMaster>
+</file>
+
+<file path=ppt/notesSlides/notesSlide1.xml><?xml version="1.0" encoding="utf-8"?>
+<p:notes xmlns:a="http://schemas.openxmlformats.org/drawingml/2006/main" xmlns:r="http://schemas.openxmlformats.org/officeDocument/2006/relationships" xmlns:p="http://schemas.openxmlformats.org/presentationml/2006/main">
+  <p:cSld>
+    <p:spTree>
+      <p:nvGrpSpPr>
+        <p:cNvPr id="1" name=""/>
+        <p:cNvGrpSpPr/>
+        <p:nvPr/>
+      </p:nvGrpSpPr>
+      <p:grpSpPr>
+        <a:xfrm>
+          <a:off x="0" y="0"/>
+          <a:ext cx="0" cy="0"/>
+          <a:chOff x="0" y="0"/>
+          <a:chExt cx="0" cy="0"/>
+        </a:xfrm>
+      </p:grpSpPr>
+      <p:sp>
+        <p:nvSpPr>
+          <p:cNvPr id="2" name="Folienbildplatzhalter 1"/>
+          <p:cNvSpPr>
+            <a:spLocks noGrp="1" noRot="1" noChangeAspect="1"/>
+          </p:cNvSpPr>
+          <p:nvPr>
+            <p:ph type="sldImg"/>
+          </p:nvPr>
+        </p:nvSpPr>
+        <p:spPr/>
+      </p:sp>
+      <p:sp>
+        <p:nvSpPr>
+          <p:cNvPr id="3" name="Notizenplatzhalter 2"/>
+          <p:cNvSpPr>
+            <a:spLocks noGrp="1"/>
+          </p:cNvSpPr>
+          <p:nvPr>
+            <p:ph type="body" idx="1"/>
+          </p:nvPr>
+        </p:nvSpPr>
+        <p:spPr/>
+        <p:txBody>
+          <a:bodyPr/>
+          <a:lstStyle/>
+          <a:p>
+            <a:endParaRPr lang="de-DE" dirty="0"/>
+          </a:p>
+        </p:txBody>
+      </p:sp>
+      <p:sp>
+        <p:nvSpPr>
+          <p:cNvPr id="4" name="Foliennummernplatzhalter 3"/>
+          <p:cNvSpPr>
+            <a:spLocks noGrp="1"/>
+          </p:cNvSpPr>
+          <p:nvPr>
+            <p:ph type="sldNum" sz="quarter" idx="5"/>
+          </p:nvPr>
+        </p:nvSpPr>
+        <p:spPr/>
+        <p:txBody>
+          <a:bodyPr/>
+          <a:lstStyle/>
+          <a:p>
+            <a:fld id="{6F4F2A7C-E896-4C15-99D8-2B5BC94A4F36}" type="slidenum">
+              <a:rPr lang="de-DE" smtClean="0"/>
+              <a:t>2</a:t>
+            </a:fld>
+            <a:endParaRPr lang="de-DE"/>
+          </a:p>
+        </p:txBody>
+      </p:sp>
+    </p:spTree>
+    <p:extLst>
+      <p:ext uri="{BB962C8B-B14F-4D97-AF65-F5344CB8AC3E}">
+        <p14:creationId xmlns:p14="http://schemas.microsoft.com/office/powerpoint/2010/main" val="724029111"/>
+      </p:ext>
+    </p:extLst>
+  </p:cSld>
+  <p:clrMapOvr>
+    <a:masterClrMapping/>
+  </p:clrMapOvr>
+</p:notes>
 </file>
 
 <file path=ppt/slideLayouts/slideLayout1.xml><?xml version="1.0" encoding="utf-8"?>
@@ -2663,6 +2747,42 @@
           <a:chExt cx="0" cy="0"/>
         </a:xfrm>
       </p:grpSpPr>
+      <p:pic>
+        <p:nvPicPr>
+          <p:cNvPr id="10" name="Grafik 9">
+            <a:extLst>
+              <a:ext uri="{FF2B5EF4-FFF2-40B4-BE49-F238E27FC236}">
+                <a16:creationId xmlns:a16="http://schemas.microsoft.com/office/drawing/2014/main" id="{D96639A4-2069-45C7-8A16-6271BDAEA6C3}"/>
+              </a:ext>
+            </a:extLst>
+          </p:cNvPr>
+          <p:cNvPicPr>
+            <a:picLocks noChangeAspect="1"/>
+          </p:cNvPicPr>
+          <p:nvPr/>
+        </p:nvPicPr>
+        <p:blipFill>
+          <a:blip r:embed="rId3">
+            <a:extLst>
+              <a:ext uri="{28A0092B-C50C-407E-A947-70E740481C1C}">
+                <a14:useLocalDpi xmlns:a14="http://schemas.microsoft.com/office/drawing/2010/main" val="0"/>
+              </a:ext>
+            </a:extLst>
+          </a:blip>
+          <a:stretch>
+            <a:fillRect/>
+          </a:stretch>
+        </p:blipFill>
+        <p:spPr>
+          <a:xfrm>
+            <a:off x="215226" y="1443186"/>
+            <a:ext cx="5486400" cy="3657600"/>
+          </a:xfrm>
+          <a:prstGeom prst="rect">
+            <a:avLst/>
+          </a:prstGeom>
+        </p:spPr>
+      </p:pic>
       <p:sp>
         <p:nvSpPr>
           <p:cNvPr id="2" name="Inhaltsplatzhalter 1">
@@ -2681,13 +2801,13 @@
         </p:nvSpPr>
         <p:spPr>
           <a:xfrm>
-            <a:off x="251520" y="3435846"/>
-            <a:ext cx="8640960" cy="1350149"/>
+            <a:off x="5220072" y="992076"/>
+            <a:ext cx="3744416" cy="3793919"/>
           </a:xfrm>
         </p:spPr>
         <p:txBody>
           <a:bodyPr>
-            <a:normAutofit lnSpcReduction="10000"/>
+            <a:normAutofit/>
           </a:bodyPr>
           <a:lstStyle/>
           <a:p>
@@ -2696,29 +2816,34 @@
           <a:p>
             <a:r>
               <a:rPr lang="de-DE" dirty="0"/>
-              <a:t>Cross Validation: 94 </a:t>
-            </a:r>
-            <a:r>
-              <a:rPr lang="de-DE" dirty="0" err="1"/>
-              <a:t>val</a:t>
-            </a:r>
-            <a:r>
-              <a:rPr lang="de-DE" dirty="0"/>
-              <a:t> </a:t>
-            </a:r>
-            <a:r>
-              <a:rPr lang="de-DE" dirty="0" err="1"/>
-              <a:t>acc</a:t>
-            </a:r>
-            <a:r>
-              <a:rPr lang="de-DE" dirty="0"/>
-              <a:t>, 97 </a:t>
-            </a:r>
-            <a:r>
-              <a:rPr lang="de-DE" dirty="0" err="1"/>
-              <a:t>acc</a:t>
-            </a:r>
-            <a:endParaRPr lang="de-DE" dirty="0"/>
+              <a:t>Cross Validation: </a:t>
+            </a:r>
+          </a:p>
+          <a:p>
+            <a:pPr lvl="1"/>
+            <a:r>
+              <a:rPr lang="de-DE" dirty="0" err="1"/>
+              <a:t>Acc</a:t>
+            </a:r>
+            <a:r>
+              <a:rPr lang="de-DE" dirty="0"/>
+              <a:t>: 0.9593</a:t>
+            </a:r>
+          </a:p>
+          <a:p>
+            <a:pPr lvl="1"/>
+            <a:r>
+              <a:rPr lang="de-DE" dirty="0"/>
+              <a:t>Val. </a:t>
+            </a:r>
+            <a:r>
+              <a:rPr lang="de-DE" dirty="0" err="1"/>
+              <a:t>Acc</a:t>
+            </a:r>
+            <a:r>
+              <a:rPr lang="de-DE" dirty="0"/>
+              <a:t>: 0.9189</a:t>
+            </a:r>
           </a:p>
           <a:p>
             <a:r>
@@ -2886,36 +3011,6 @@
           </a:p>
         </p:txBody>
       </p:sp>
-      <p:pic>
-        <p:nvPicPr>
-          <p:cNvPr id="6" name="Grafik 5">
-            <a:extLst>
-              <a:ext uri="{FF2B5EF4-FFF2-40B4-BE49-F238E27FC236}">
-                <a16:creationId xmlns:a16="http://schemas.microsoft.com/office/drawing/2014/main" id="{2EA56D4F-1A92-4676-9DA9-F1EF8EEF4A97}"/>
-              </a:ext>
-            </a:extLst>
-          </p:cNvPr>
-          <p:cNvPicPr>
-            <a:picLocks noChangeAspect="1"/>
-          </p:cNvPicPr>
-          <p:nvPr/>
-        </p:nvPicPr>
-        <p:blipFill>
-          <a:blip r:embed="rId2"/>
-          <a:stretch>
-            <a:fillRect/>
-          </a:stretch>
-        </p:blipFill>
-        <p:spPr>
-          <a:xfrm>
-            <a:off x="1381654" y="1573962"/>
-            <a:ext cx="6156176" cy="2083484"/>
-          </a:xfrm>
-          <a:prstGeom prst="rect">
-            <a:avLst/>
-          </a:prstGeom>
-        </p:spPr>
-      </p:pic>
       <p:sp>
         <p:nvSpPr>
           <p:cNvPr id="8" name="Inhaltsplatzhalter 1">
@@ -2932,8 +3027,8 @@
         </p:nvSpPr>
         <p:spPr>
           <a:xfrm>
-            <a:off x="403920" y="771550"/>
-            <a:ext cx="8640960" cy="936104"/>
+            <a:off x="323528" y="771550"/>
+            <a:ext cx="3024336" cy="936104"/>
           </a:xfrm>
           <a:prstGeom prst="rect">
             <a:avLst/>
@@ -3101,7 +3196,7 @@
           <a:p>
             <a:r>
               <a:rPr lang="de-DE" dirty="0" err="1"/>
-              <a:t>Currently</a:t>
+              <a:t>Current</a:t>
             </a:r>
             <a:r>
               <a:rPr lang="de-DE" dirty="0"/>
@@ -4019,7 +4114,12 @@
             <p:ph idx="1"/>
           </p:nvPr>
         </p:nvSpPr>
-        <p:spPr/>
+        <p:spPr>
+          <a:xfrm>
+            <a:off x="251520" y="1202574"/>
+            <a:ext cx="5184576" cy="3400026"/>
+          </a:xfrm>
+        </p:spPr>
         <p:txBody>
           <a:bodyPr/>
           <a:lstStyle/>
@@ -4099,6 +4199,33 @@
           <a:p>
             <a:r>
               <a:rPr lang="de-DE" dirty="0" err="1"/>
+              <a:t>Blob</a:t>
+            </a:r>
+            <a:r>
+              <a:rPr lang="de-DE" dirty="0"/>
+              <a:t> </a:t>
+            </a:r>
+            <a:r>
+              <a:rPr lang="de-DE" dirty="0" err="1"/>
+              <a:t>detection</a:t>
+            </a:r>
+            <a:r>
+              <a:rPr lang="de-DE" dirty="0"/>
+              <a:t> in </a:t>
+            </a:r>
+            <a:r>
+              <a:rPr lang="de-DE" dirty="0" err="1"/>
+              <a:t>progress</a:t>
+            </a:r>
+            <a:r>
+              <a:rPr lang="de-DE" dirty="0"/>
+              <a:t>:</a:t>
+            </a:r>
+          </a:p>
+          <a:p>
+            <a:pPr lvl="1"/>
+            <a:r>
+              <a:rPr lang="de-DE" dirty="0" err="1"/>
               <a:t>Have</a:t>
             </a:r>
             <a:r>
@@ -4228,6 +4355,29 @@
             <a:r>
               <a:rPr lang="de-DE" dirty="0" err="1"/>
               <a:t>training</a:t>
+            </a:r>
+            <a:endParaRPr lang="de-DE" dirty="0"/>
+          </a:p>
+          <a:p>
+            <a:r>
+              <a:rPr lang="de-DE" dirty="0" err="1"/>
+              <a:t>Blob</a:t>
+            </a:r>
+            <a:r>
+              <a:rPr lang="de-DE" dirty="0"/>
+              <a:t> </a:t>
+            </a:r>
+            <a:r>
+              <a:rPr lang="de-DE" dirty="0" err="1"/>
+              <a:t>extraction</a:t>
+            </a:r>
+            <a:r>
+              <a:rPr lang="de-DE" dirty="0"/>
+              <a:t> </a:t>
+            </a:r>
+            <a:r>
+              <a:rPr lang="de-DE" dirty="0" err="1"/>
+              <a:t>working</a:t>
             </a:r>
             <a:endParaRPr lang="de-DE" dirty="0"/>
           </a:p>
@@ -4294,6 +4444,36 @@
           </a:p>
         </p:txBody>
       </p:sp>
+      <p:pic>
+        <p:nvPicPr>
+          <p:cNvPr id="5" name="Grafik 4">
+            <a:extLst>
+              <a:ext uri="{FF2B5EF4-FFF2-40B4-BE49-F238E27FC236}">
+                <a16:creationId xmlns:a16="http://schemas.microsoft.com/office/drawing/2014/main" id="{7D6E854F-EF09-4E52-B616-4F31B41DA1D4}"/>
+              </a:ext>
+            </a:extLst>
+          </p:cNvPr>
+          <p:cNvPicPr>
+            <a:picLocks noChangeAspect="1"/>
+          </p:cNvPicPr>
+          <p:nvPr/>
+        </p:nvPicPr>
+        <p:blipFill>
+          <a:blip r:embed="rId2"/>
+          <a:stretch>
+            <a:fillRect/>
+          </a:stretch>
+        </p:blipFill>
+        <p:spPr>
+          <a:xfrm>
+            <a:off x="6363172" y="199806"/>
+            <a:ext cx="2780828" cy="4943694"/>
+          </a:xfrm>
+          <a:prstGeom prst="rect">
+            <a:avLst/>
+          </a:prstGeom>
+        </p:spPr>
+      </p:pic>
     </p:spTree>
     <p:extLst>
       <p:ext uri="{BB962C8B-B14F-4D97-AF65-F5344CB8AC3E}">

</xml_diff>